<commit_message>
Minor adjustments on template
</commit_message>
<xml_diff>
--- a/01 spfx + sp rest api.pptx
+++ b/01 spfx + sp rest api.pptx
@@ -11,18 +11,18 @@
     <p:handoutMasterId r:id="rId16"/>
   </p:handoutMasterIdLst>
   <p:sldIdLst>
-    <p:sldId id="257" r:id="rId3"/>
-    <p:sldId id="263" r:id="rId4"/>
+    <p:sldId id="1562" r:id="rId3"/>
+    <p:sldId id="1563" r:id="rId4"/>
     <p:sldId id="1547" r:id="rId5"/>
     <p:sldId id="1548" r:id="rId6"/>
-    <p:sldId id="1549" r:id="rId7"/>
-    <p:sldId id="1550" r:id="rId8"/>
-    <p:sldId id="1551" r:id="rId9"/>
-    <p:sldId id="265" r:id="rId10"/>
-    <p:sldId id="283" r:id="rId11"/>
-    <p:sldId id="279" r:id="rId12"/>
-    <p:sldId id="261" r:id="rId13"/>
-    <p:sldId id="260" r:id="rId14"/>
+    <p:sldId id="1564" r:id="rId7"/>
+    <p:sldId id="1565" r:id="rId8"/>
+    <p:sldId id="1566" r:id="rId9"/>
+    <p:sldId id="1567" r:id="rId10"/>
+    <p:sldId id="1568" r:id="rId11"/>
+    <p:sldId id="1569" r:id="rId12"/>
+    <p:sldId id="1570" r:id="rId13"/>
+    <p:sldId id="1571" r:id="rId14"/>
   </p:sldIdLst>
   <p:sldSz cx="12436475" cy="6994525"/>
   <p:notesSz cx="6858000" cy="9144000"/>
@@ -126,26 +126,26 @@
       <p14:sectionLst xmlns:p14="http://schemas.microsoft.com/office/powerpoint/2010/main">
         <p14:section name="intro" id="{E1FBED56-7E21-C94D-8049-451270E8C32A}">
           <p14:sldIdLst>
-            <p14:sldId id="257"/>
-            <p14:sldId id="263"/>
+            <p14:sldId id="1562"/>
+            <p14:sldId id="1563"/>
           </p14:sldIdLst>
         </p14:section>
-        <p14:section name="body" id="{3A7429EF-79F1-A44F-B2E7-33EA665B892A}">
+        <p14:section name="body" id="{3D9C80B2-EAAE-E24F-83D7-5970E147313E}">
           <p14:sldIdLst>
             <p14:sldId id="1547"/>
             <p14:sldId id="1548"/>
-            <p14:sldId id="1549"/>
-            <p14:sldId id="1550"/>
-            <p14:sldId id="1551"/>
-            <p14:sldId id="265"/>
+            <p14:sldId id="1564"/>
+            <p14:sldId id="1565"/>
+            <p14:sldId id="1566"/>
+            <p14:sldId id="1567"/>
           </p14:sldIdLst>
         </p14:section>
         <p14:section name="outro" id="{E93196B6-EFE2-3242-B776-C77C0FCFFEF1}">
           <p14:sldIdLst>
-            <p14:sldId id="283"/>
-            <p14:sldId id="279"/>
-            <p14:sldId id="261"/>
-            <p14:sldId id="260"/>
+            <p14:sldId id="1568"/>
+            <p14:sldId id="1569"/>
+            <p14:sldId id="1570"/>
+            <p14:sldId id="1571"/>
           </p14:sldIdLst>
         </p14:section>
       </p14:sectionLst>
@@ -226,9 +226,12 @@
             </a:lvl1pPr>
           </a:lstStyle>
           <a:p>
-            <a:endParaRPr lang="en-US" dirty="0">
-              <a:latin typeface="Segoe UI" pitchFamily="34" charset="0"/>
-            </a:endParaRPr>
+            <a:r>
+              <a:rPr lang="en-US" dirty="0">
+                <a:latin typeface="Segoe UI" pitchFamily="34" charset="0"/>
+              </a:rPr>
+              <a:t>SharePoint Framework</a:t>
+            </a:r>
           </a:p>
         </p:txBody>
       </p:sp>
@@ -263,7 +266,7 @@
               <a:rPr lang="en-US" smtClean="0">
                 <a:latin typeface="Segoe UI" pitchFamily="34" charset="0"/>
               </a:rPr>
-              <a:t>12/20/18 12:43 PM</a:t>
+              <a:t>12/20/2018 9:08 PM</a:t>
             </a:fld>
             <a:endParaRPr lang="en-US" dirty="0">
               <a:latin typeface="Segoe UI" pitchFamily="34" charset="0"/>
@@ -423,7 +426,10 @@
             </a:lvl1pPr>
           </a:lstStyle>
           <a:p>
-            <a:endParaRPr lang="en-US" dirty="0"/>
+            <a:r>
+              <a:rPr lang="en-US" dirty="0"/>
+              <a:t>SharePoint Framework</a:t>
+            </a:r>
           </a:p>
         </p:txBody>
       </p:sp>
@@ -557,7 +563,7 @@
           <a:p>
             <a:fld id="{D18B56EA-E28F-4F92-9F16-7A6F2501B303}" type="datetime8">
               <a:rPr lang="en-US" smtClean="0"/>
-              <a:t>12/20/18 12:43 PM</a:t>
+              <a:t>12/20/2018 9:08 PM</a:t>
             </a:fld>
             <a:endParaRPr lang="en-US" dirty="0"/>
           </a:p>
@@ -940,7 +946,7 @@
           <a:p>
             <a:fld id="{D18B56EA-E28F-4F92-9F16-7A6F2501B303}" type="datetime8">
               <a:rPr lang="en-US" smtClean="0"/>
-              <a:t>12/20/18 12:43 PM</a:t>
+              <a:t>12/20/2018 9:08 PM</a:t>
             </a:fld>
             <a:endParaRPr lang="en-US" dirty="0"/>
           </a:p>
@@ -1121,7 +1127,7 @@
           <a:p>
             <a:fld id="{D18B56EA-E28F-4F92-9F16-7A6F2501B303}" type="datetime8">
               <a:rPr lang="en-US" smtClean="0"/>
-              <a:t>12/20/18 12:43 PM</a:t>
+              <a:t>12/20/2018 9:08 PM</a:t>
             </a:fld>
             <a:endParaRPr lang="en-US" dirty="0"/>
           </a:p>
@@ -1464,7 +1470,7 @@
           <a:p>
             <a:fld id="{D18B56EA-E28F-4F92-9F16-7A6F2501B303}" type="datetime8">
               <a:rPr lang="en-US" smtClean="0"/>
-              <a:t>12/20/18 12:43 PM</a:t>
+              <a:t>12/20/2018 9:08 PM</a:t>
             </a:fld>
             <a:endParaRPr lang="en-US" dirty="0"/>
           </a:p>
@@ -1645,7 +1651,7 @@
           <a:p>
             <a:fld id="{D18B56EA-E28F-4F92-9F16-7A6F2501B303}" type="datetime8">
               <a:rPr lang="en-US" smtClean="0"/>
-              <a:t>12/20/18 12:43 PM</a:t>
+              <a:t>12/20/2018 9:08 PM</a:t>
             </a:fld>
             <a:endParaRPr lang="en-US" dirty="0"/>
           </a:p>
@@ -1826,7 +1832,7 @@
           <a:p>
             <a:fld id="{D18B56EA-E28F-4F92-9F16-7A6F2501B303}" type="datetime8">
               <a:rPr lang="en-US" smtClean="0"/>
-              <a:t>12/20/18 12:43 PM</a:t>
+              <a:t>12/20/2018 9:08 PM</a:t>
             </a:fld>
             <a:endParaRPr lang="en-US" dirty="0"/>
           </a:p>
@@ -2007,7 +2013,7 @@
           <a:p>
             <a:fld id="{D18B56EA-E28F-4F92-9F16-7A6F2501B303}" type="datetime8">
               <a:rPr lang="en-US" smtClean="0"/>
-              <a:t>12/20/18 12:43 PM</a:t>
+              <a:t>12/20/2018 9:08 PM</a:t>
             </a:fld>
             <a:endParaRPr lang="en-US" dirty="0"/>
           </a:p>
@@ -6286,7 +6292,7 @@
           <a:lstStyle/>
           <a:p>
             <a:r>
-              <a:rPr lang="en-US"/>
+              <a:rPr lang="en-US" dirty="0"/>
               <a:t>Click icon to add table</a:t>
             </a:r>
           </a:p>
@@ -6707,8 +6713,8 @@
 </file>
 
 <file path=ppt/slideLayouts/slideLayout26.xml><?xml version="1.0" encoding="utf-8"?>
-<p:sldLayout xmlns:a="http://schemas.openxmlformats.org/drawingml/2006/main" xmlns:r="http://schemas.openxmlformats.org/officeDocument/2006/relationships" xmlns:p="http://schemas.openxmlformats.org/presentationml/2006/main" preserve="1" userDrawn="1">
-  <p:cSld name="1_Developer Code Layout">
+<p:sldLayout xmlns:a="http://schemas.openxmlformats.org/drawingml/2006/main" xmlns:r="http://schemas.openxmlformats.org/officeDocument/2006/relationships" xmlns:p="http://schemas.openxmlformats.org/presentationml/2006/main" userDrawn="1">
+  <p:cSld name="Developer Code Layout">
     <p:spTree>
       <p:nvGrpSpPr>
         <p:cNvPr id="1" name=""/>
@@ -7003,7 +7009,7 @@
     </p:spTree>
     <p:extLst>
       <p:ext uri="{BB962C8B-B14F-4D97-AF65-F5344CB8AC3E}">
-        <p14:creationId xmlns:p14="http://schemas.microsoft.com/office/powerpoint/2010/main" val="2118196420"/>
+        <p14:creationId xmlns:p14="http://schemas.microsoft.com/office/powerpoint/2010/main" val="2517332202"/>
       </p:ext>
     </p:extLst>
   </p:cSld>
@@ -7017,8 +7023,8 @@
 </file>
 
 <file path=ppt/slideLayouts/slideLayout27.xml><?xml version="1.0" encoding="utf-8"?>
-<p:sldLayout xmlns:a="http://schemas.openxmlformats.org/drawingml/2006/main" xmlns:r="http://schemas.openxmlformats.org/officeDocument/2006/relationships" xmlns:p="http://schemas.openxmlformats.org/presentationml/2006/main" preserve="1" userDrawn="1">
-  <p:cSld name="1_Title &amp; 2-color Non-bulleted text">
+<p:sldLayout xmlns:a="http://schemas.openxmlformats.org/drawingml/2006/main" xmlns:r="http://schemas.openxmlformats.org/officeDocument/2006/relationships" xmlns:p="http://schemas.openxmlformats.org/presentationml/2006/main" userDrawn="1">
+  <p:cSld name="Title &amp; 2-color Non-bulleted text">
     <p:spTree>
       <p:nvGrpSpPr>
         <p:cNvPr id="1" name=""/>
@@ -7160,7 +7166,7 @@
     </p:spTree>
     <p:extLst>
       <p:ext uri="{BB962C8B-B14F-4D97-AF65-F5344CB8AC3E}">
-        <p14:creationId xmlns:p14="http://schemas.microsoft.com/office/powerpoint/2010/main" val="1467067199"/>
+        <p14:creationId xmlns:p14="http://schemas.microsoft.com/office/powerpoint/2010/main" val="3845859015"/>
       </p:ext>
     </p:extLst>
   </p:cSld>
@@ -7174,8 +7180,8 @@
 </file>
 
 <file path=ppt/slideLayouts/slideLayout28.xml><?xml version="1.0" encoding="utf-8"?>
-<p:sldLayout xmlns:a="http://schemas.openxmlformats.org/drawingml/2006/main" xmlns:r="http://schemas.openxmlformats.org/officeDocument/2006/relationships" xmlns:p="http://schemas.openxmlformats.org/presentationml/2006/main" preserve="1" userDrawn="1">
-  <p:cSld name="1_Title and Content">
+<p:sldLayout xmlns:a="http://schemas.openxmlformats.org/drawingml/2006/main" xmlns:r="http://schemas.openxmlformats.org/officeDocument/2006/relationships" xmlns:p="http://schemas.openxmlformats.org/presentationml/2006/main" userDrawn="1">
+  <p:cSld name="Title and Content">
     <p:spTree>
       <p:nvGrpSpPr>
         <p:cNvPr id="1" name=""/>
@@ -7309,7 +7315,7 @@
     </p:spTree>
     <p:extLst>
       <p:ext uri="{BB962C8B-B14F-4D97-AF65-F5344CB8AC3E}">
-        <p14:creationId xmlns:p14="http://schemas.microsoft.com/office/powerpoint/2010/main" val="3698661701"/>
+        <p14:creationId xmlns:p14="http://schemas.microsoft.com/office/powerpoint/2010/main" val="2439250095"/>
       </p:ext>
     </p:extLst>
   </p:cSld>
@@ -14218,9 +14224,9 @@
     <p:sldLayoutId id="2147484545" r:id="rId23"/>
     <p:sldLayoutId id="2147484546" r:id="rId24"/>
     <p:sldLayoutId id="2147484299" r:id="rId25"/>
-    <p:sldLayoutId id="2147484559" r:id="rId26"/>
-    <p:sldLayoutId id="2147484560" r:id="rId27"/>
-    <p:sldLayoutId id="2147484561" r:id="rId28"/>
+    <p:sldLayoutId id="2147484552" r:id="rId26"/>
+    <p:sldLayoutId id="2147484556" r:id="rId27"/>
+    <p:sldLayoutId id="2147484559" r:id="rId28"/>
   </p:sldLayoutIdLst>
   <p:transition>
     <p:fade/>
@@ -14777,7 +14783,7 @@
     </p:spTree>
     <p:extLst>
       <p:ext uri="{BB962C8B-B14F-4D97-AF65-F5344CB8AC3E}">
-        <p14:creationId xmlns:p14="http://schemas.microsoft.com/office/powerpoint/2010/main" val="699719167"/>
+        <p14:creationId xmlns:p14="http://schemas.microsoft.com/office/powerpoint/2010/main" val="2527867444"/>
       </p:ext>
     </p:extLst>
   </p:cSld>
@@ -15171,7 +15177,7 @@
     </p:spTree>
     <p:extLst>
       <p:ext uri="{BB962C8B-B14F-4D97-AF65-F5344CB8AC3E}">
-        <p14:creationId xmlns:p14="http://schemas.microsoft.com/office/powerpoint/2010/main" val="3724015835"/>
+        <p14:creationId xmlns:p14="http://schemas.microsoft.com/office/powerpoint/2010/main" val="3861675144"/>
       </p:ext>
     </p:extLst>
   </p:cSld>
@@ -15213,7 +15219,7 @@
     </p:spTree>
     <p:extLst>
       <p:ext uri="{BB962C8B-B14F-4D97-AF65-F5344CB8AC3E}">
-        <p14:creationId xmlns:p14="http://schemas.microsoft.com/office/powerpoint/2010/main" val="3660847957"/>
+        <p14:creationId xmlns:p14="http://schemas.microsoft.com/office/powerpoint/2010/main" val="2920092992"/>
       </p:ext>
     </p:extLst>
   </p:cSld>
@@ -15474,7 +15480,7 @@
     </p:spTree>
     <p:extLst>
       <p:ext uri="{BB962C8B-B14F-4D97-AF65-F5344CB8AC3E}">
-        <p14:creationId xmlns:p14="http://schemas.microsoft.com/office/powerpoint/2010/main" val="60090990"/>
+        <p14:creationId xmlns:p14="http://schemas.microsoft.com/office/powerpoint/2010/main" val="2930309436"/>
       </p:ext>
     </p:extLst>
   </p:cSld>
@@ -16978,7 +16984,7 @@
     </p:spTree>
     <p:extLst>
       <p:ext uri="{BB962C8B-B14F-4D97-AF65-F5344CB8AC3E}">
-        <p14:creationId xmlns:p14="http://schemas.microsoft.com/office/powerpoint/2010/main" val="2509242320"/>
+        <p14:creationId xmlns:p14="http://schemas.microsoft.com/office/powerpoint/2010/main" val="2954236782"/>
       </p:ext>
     </p:extLst>
   </p:cSld>

</xml_diff>